<commit_message>
update / add static images
</commit_message>
<xml_diff>
--- a/static/images/logo-RCM-coop-dev.pptx
+++ b/static/images/logo-RCM-coop-dev.pptx
@@ -8,14 +8,15 @@
     <p:sldId id="256" r:id="rId2"/>
     <p:sldId id="257" r:id="rId3"/>
     <p:sldId id="258" r:id="rId4"/>
-    <p:sldId id="273" r:id="rId5"/>
-    <p:sldId id="271" r:id="rId6"/>
-    <p:sldId id="272" r:id="rId7"/>
-    <p:sldId id="262" r:id="rId8"/>
-    <p:sldId id="269" r:id="rId9"/>
-    <p:sldId id="267" r:id="rId10"/>
-    <p:sldId id="268" r:id="rId11"/>
-    <p:sldId id="270" r:id="rId12"/>
+    <p:sldId id="274" r:id="rId5"/>
+    <p:sldId id="273" r:id="rId6"/>
+    <p:sldId id="271" r:id="rId7"/>
+    <p:sldId id="272" r:id="rId8"/>
+    <p:sldId id="262" r:id="rId9"/>
+    <p:sldId id="269" r:id="rId10"/>
+    <p:sldId id="267" r:id="rId11"/>
+    <p:sldId id="268" r:id="rId12"/>
+    <p:sldId id="270" r:id="rId13"/>
   </p:sldIdLst>
   <p:sldSz cx="12192000" cy="6858000"/>
   <p:notesSz cx="6858000" cy="9144000"/>
@@ -122,20 +123,75 @@
 </p:presentation>
 </file>
 
-<file path=ppt/revisionInfo.xml><?xml version="1.0" encoding="utf-8"?>
-<p1510:revInfo xmlns:a="http://schemas.openxmlformats.org/drawingml/2006/main" xmlns:r="http://schemas.openxmlformats.org/officeDocument/2006/relationships" xmlns:p1510="http://schemas.microsoft.com/office/powerpoint/2015/10/main">
-  <p1510:revLst>
-    <p1510:client id="{F1C8B9D2-4377-2C45-B746-CF37BA7A4C1F}" v="48" dt="2025-02-10T13:22:07.152"/>
-  </p1510:revLst>
-</p1510:revInfo>
-</file>
-
 <file path=ppt/changesInfos/changesInfo1.xml><?xml version="1.0" encoding="utf-8"?>
 <pc:chgInfo xmlns:a="http://schemas.openxmlformats.org/drawingml/2006/main" xmlns:r="http://schemas.openxmlformats.org/officeDocument/2006/relationships" xmlns:ac="http://schemas.microsoft.com/office/drawing/2013/main/command" xmlns:pc="http://schemas.microsoft.com/office/powerpoint/2013/main/command">
   <pc:docChgLst>
+    <pc:chgData name="Cassandra Gould Van Praag" userId="d2248499-4cc7-4575-92a4-3dec06827e7f" providerId="ADAL" clId="{D02E31F4-74D5-B14A-83E5-B7100460409E}"/>
+    <pc:docChg chg="custSel addSld modSld">
+      <pc:chgData name="Cassandra Gould Van Praag" userId="d2248499-4cc7-4575-92a4-3dec06827e7f" providerId="ADAL" clId="{D02E31F4-74D5-B14A-83E5-B7100460409E}" dt="2025-02-26T16:51:31.058" v="35" actId="12789"/>
+      <pc:docMkLst>
+        <pc:docMk/>
+      </pc:docMkLst>
+      <pc:sldChg chg="addSp delSp modSp mod">
+        <pc:chgData name="Cassandra Gould Van Praag" userId="d2248499-4cc7-4575-92a4-3dec06827e7f" providerId="ADAL" clId="{D02E31F4-74D5-B14A-83E5-B7100460409E}" dt="2025-02-26T16:50:11.642" v="9" actId="478"/>
+        <pc:sldMkLst>
+          <pc:docMk/>
+          <pc:sldMk cId="364564612" sldId="258"/>
+        </pc:sldMkLst>
+      </pc:sldChg>
+      <pc:sldChg chg="addSp delSp modSp add mod">
+        <pc:chgData name="Cassandra Gould Van Praag" userId="d2248499-4cc7-4575-92a4-3dec06827e7f" providerId="ADAL" clId="{D02E31F4-74D5-B14A-83E5-B7100460409E}" dt="2025-02-26T16:51:31.058" v="35" actId="12789"/>
+        <pc:sldMkLst>
+          <pc:docMk/>
+          <pc:sldMk cId="3067319856" sldId="274"/>
+        </pc:sldMkLst>
+        <pc:spChg chg="add mod">
+          <ac:chgData name="Cassandra Gould Van Praag" userId="d2248499-4cc7-4575-92a4-3dec06827e7f" providerId="ADAL" clId="{D02E31F4-74D5-B14A-83E5-B7100460409E}" dt="2025-02-26T16:51:31.058" v="35" actId="12789"/>
+          <ac:spMkLst>
+            <pc:docMk/>
+            <pc:sldMk cId="3067319856" sldId="274"/>
+            <ac:spMk id="8" creationId="{742DB6F1-2973-D97D-F806-FF0D30E91F1F}"/>
+          </ac:spMkLst>
+        </pc:spChg>
+        <pc:grpChg chg="mod">
+          <ac:chgData name="Cassandra Gould Van Praag" userId="d2248499-4cc7-4575-92a4-3dec06827e7f" providerId="ADAL" clId="{D02E31F4-74D5-B14A-83E5-B7100460409E}" dt="2025-02-26T16:51:31.058" v="35" actId="12789"/>
+          <ac:grpSpMkLst>
+            <pc:docMk/>
+            <pc:sldMk cId="3067319856" sldId="274"/>
+            <ac:grpSpMk id="2" creationId="{9D9AE90F-3401-8BC1-BA6B-B1EE0CB4064E}"/>
+          </ac:grpSpMkLst>
+        </pc:grpChg>
+      </pc:sldChg>
+    </pc:docChg>
+  </pc:docChgLst>
+  <pc:docChgLst>
+    <pc:chgData name="Cassandra Gould Van Praag" userId="d2248499-4cc7-4575-92a4-3dec06827e7f" providerId="ADAL" clId="{F52208EF-5CD1-B344-9B72-B3D57CC512E2}"/>
+    <pc:docChg chg="modSld">
+      <pc:chgData name="Cassandra Gould Van Praag" userId="d2248499-4cc7-4575-92a4-3dec06827e7f" providerId="ADAL" clId="{F52208EF-5CD1-B344-9B72-B3D57CC512E2}" dt="2025-04-28T15:54:37.375" v="1" actId="1036"/>
+      <pc:docMkLst>
+        <pc:docMk/>
+      </pc:docMkLst>
+      <pc:sldChg chg="modSp mod">
+        <pc:chgData name="Cassandra Gould Van Praag" userId="d2248499-4cc7-4575-92a4-3dec06827e7f" providerId="ADAL" clId="{F52208EF-5CD1-B344-9B72-B3D57CC512E2}" dt="2025-04-28T15:54:37.375" v="1" actId="1036"/>
+        <pc:sldMkLst>
+          <pc:docMk/>
+          <pc:sldMk cId="3067319856" sldId="274"/>
+        </pc:sldMkLst>
+        <pc:grpChg chg="mod">
+          <ac:chgData name="Cassandra Gould Van Praag" userId="d2248499-4cc7-4575-92a4-3dec06827e7f" providerId="ADAL" clId="{F52208EF-5CD1-B344-9B72-B3D57CC512E2}" dt="2025-04-28T15:54:37.375" v="1" actId="1036"/>
+          <ac:grpSpMkLst>
+            <pc:docMk/>
+            <pc:sldMk cId="3067319856" sldId="274"/>
+            <ac:grpSpMk id="2" creationId="{9D9AE90F-3401-8BC1-BA6B-B1EE0CB4064E}"/>
+          </ac:grpSpMkLst>
+        </pc:grpChg>
+      </pc:sldChg>
+    </pc:docChg>
+  </pc:docChgLst>
+  <pc:docChgLst>
     <pc:chgData name="Cassandra Gould Van Praag" userId="d2248499-4cc7-4575-92a4-3dec06827e7f" providerId="ADAL" clId="{F1C8B9D2-4377-2C45-B746-CF37BA7A4C1F}"/>
     <pc:docChg chg="undo redo custSel addSld delSld modSld sldOrd">
-      <pc:chgData name="Cassandra Gould Van Praag" userId="d2248499-4cc7-4575-92a4-3dec06827e7f" providerId="ADAL" clId="{F1C8B9D2-4377-2C45-B746-CF37BA7A4C1F}" dt="2025-02-10T13:22:16.820" v="379" actId="14100"/>
+      <pc:chgData name="Cassandra Gould Van Praag" userId="d2248499-4cc7-4575-92a4-3dec06827e7f" providerId="ADAL" clId="{F1C8B9D2-4377-2C45-B746-CF37BA7A4C1F}" dt="2025-02-13T01:19:24.053" v="390" actId="164"/>
       <pc:docMkLst>
         <pc:docMk/>
       </pc:docMkLst>
@@ -153,23 +209,15 @@
             <ac:spMk id="16" creationId="{6771B0C7-8D26-2470-446B-3B77F44788C8}"/>
           </ac:spMkLst>
         </pc:spChg>
-        <pc:spChg chg="mod">
-          <ac:chgData name="Cassandra Gould Van Praag" userId="d2248499-4cc7-4575-92a4-3dec06827e7f" providerId="ADAL" clId="{F1C8B9D2-4377-2C45-B746-CF37BA7A4C1F}" dt="2025-01-23T18:14:43.275" v="12" actId="207"/>
-          <ac:spMkLst>
-            <pc:docMk/>
-            <pc:sldMk cId="2559353360" sldId="257"/>
-            <ac:spMk id="17" creationId="{F22AB369-BD75-6503-D37B-4851BC14857A}"/>
-          </ac:spMkLst>
-        </pc:spChg>
       </pc:sldChg>
       <pc:sldChg chg="addSp delSp modSp add mod">
-        <pc:chgData name="Cassandra Gould Van Praag" userId="d2248499-4cc7-4575-92a4-3dec06827e7f" providerId="ADAL" clId="{F1C8B9D2-4377-2C45-B746-CF37BA7A4C1F}" dt="2025-01-23T18:23:37.256" v="51"/>
+        <pc:chgData name="Cassandra Gould Van Praag" userId="d2248499-4cc7-4575-92a4-3dec06827e7f" providerId="ADAL" clId="{F1C8B9D2-4377-2C45-B746-CF37BA7A4C1F}" dt="2025-02-13T01:19:24.053" v="390" actId="164"/>
         <pc:sldMkLst>
           <pc:docMk/>
           <pc:sldMk cId="364564612" sldId="258"/>
         </pc:sldMkLst>
         <pc:spChg chg="mod">
-          <ac:chgData name="Cassandra Gould Van Praag" userId="d2248499-4cc7-4575-92a4-3dec06827e7f" providerId="ADAL" clId="{F1C8B9D2-4377-2C45-B746-CF37BA7A4C1F}" dt="2025-01-23T18:17:56.947" v="48" actId="207"/>
+          <ac:chgData name="Cassandra Gould Van Praag" userId="d2248499-4cc7-4575-92a4-3dec06827e7f" providerId="ADAL" clId="{F1C8B9D2-4377-2C45-B746-CF37BA7A4C1F}" dt="2025-02-13T01:19:24.053" v="390" actId="164"/>
           <ac:spMkLst>
             <pc:docMk/>
             <pc:sldMk cId="364564612" sldId="258"/>
@@ -177,15 +225,23 @@
           </ac:spMkLst>
         </pc:spChg>
         <pc:spChg chg="mod">
-          <ac:chgData name="Cassandra Gould Van Praag" userId="d2248499-4cc7-4575-92a4-3dec06827e7f" providerId="ADAL" clId="{F1C8B9D2-4377-2C45-B746-CF37BA7A4C1F}" dt="2025-01-23T18:18:06.487" v="49" actId="207"/>
+          <ac:chgData name="Cassandra Gould Van Praag" userId="d2248499-4cc7-4575-92a4-3dec06827e7f" providerId="ADAL" clId="{F1C8B9D2-4377-2C45-B746-CF37BA7A4C1F}" dt="2025-02-13T01:19:24.053" v="390" actId="164"/>
           <ac:spMkLst>
             <pc:docMk/>
             <pc:sldMk cId="364564612" sldId="258"/>
             <ac:spMk id="17" creationId="{1DAA92DE-3F47-D461-4A54-D721976E6B3D}"/>
           </ac:spMkLst>
         </pc:spChg>
+        <pc:grpChg chg="add mod">
+          <ac:chgData name="Cassandra Gould Van Praag" userId="d2248499-4cc7-4575-92a4-3dec06827e7f" providerId="ADAL" clId="{F1C8B9D2-4377-2C45-B746-CF37BA7A4C1F}" dt="2025-02-13T01:19:24.053" v="390" actId="164"/>
+          <ac:grpSpMkLst>
+            <pc:docMk/>
+            <pc:sldMk cId="364564612" sldId="258"/>
+            <ac:grpSpMk id="2" creationId="{D09EFF0C-069A-F548-A200-428A26541F1B}"/>
+          </ac:grpSpMkLst>
+        </pc:grpChg>
         <pc:picChg chg="mod">
-          <ac:chgData name="Cassandra Gould Van Praag" userId="d2248499-4cc7-4575-92a4-3dec06827e7f" providerId="ADAL" clId="{F1C8B9D2-4377-2C45-B746-CF37BA7A4C1F}" dt="2025-01-23T18:18:20.324" v="50" actId="1076"/>
+          <ac:chgData name="Cassandra Gould Van Praag" userId="d2248499-4cc7-4575-92a4-3dec06827e7f" providerId="ADAL" clId="{F1C8B9D2-4377-2C45-B746-CF37BA7A4C1F}" dt="2025-02-13T01:19:24.053" v="390" actId="164"/>
           <ac:picMkLst>
             <pc:docMk/>
             <pc:sldMk cId="364564612" sldId="258"/>
@@ -335,7 +391,7 @@
         </pc:picChg>
       </pc:sldChg>
       <pc:sldChg chg="addSp delSp modSp new mod">
-        <pc:chgData name="Cassandra Gould Van Praag" userId="d2248499-4cc7-4575-92a4-3dec06827e7f" providerId="ADAL" clId="{F1C8B9D2-4377-2C45-B746-CF37BA7A4C1F}" dt="2025-02-05T17:09:10.041" v="336"/>
+        <pc:chgData name="Cassandra Gould Van Praag" userId="d2248499-4cc7-4575-92a4-3dec06827e7f" providerId="ADAL" clId="{F1C8B9D2-4377-2C45-B746-CF37BA7A4C1F}" dt="2025-02-13T01:13:03.216" v="389" actId="478"/>
         <pc:sldMkLst>
           <pc:docMk/>
           <pc:sldMk cId="193331974" sldId="270"/>
@@ -485,7 +541,7 @@
           </ac:picMkLst>
         </pc:picChg>
         <pc:picChg chg="add mod">
-          <ac:chgData name="Cassandra Gould Van Praag" userId="d2248499-4cc7-4575-92a4-3dec06827e7f" providerId="ADAL" clId="{F1C8B9D2-4377-2C45-B746-CF37BA7A4C1F}" dt="2025-02-05T17:08:07.702" v="328" actId="1076"/>
+          <ac:chgData name="Cassandra Gould Van Praag" userId="d2248499-4cc7-4575-92a4-3dec06827e7f" providerId="ADAL" clId="{F1C8B9D2-4377-2C45-B746-CF37BA7A4C1F}" dt="2025-02-13T01:10:36.377" v="380" actId="1076"/>
           <ac:picMkLst>
             <pc:docMk/>
             <pc:sldMk cId="193331974" sldId="270"/>
@@ -748,7 +804,7 @@
           <a:p>
             <a:fld id="{B9AF1358-2D8A-7743-80A8-998FCC7F2732}" type="datetimeFigureOut">
               <a:rPr lang="en-US" smtClean="0"/>
-              <a:t>2/5/25</a:t>
+              <a:t>4/28/25</a:t>
             </a:fld>
             <a:endParaRPr lang="en-US"/>
           </a:p>
@@ -948,7 +1004,7 @@
           <a:p>
             <a:fld id="{B9AF1358-2D8A-7743-80A8-998FCC7F2732}" type="datetimeFigureOut">
               <a:rPr lang="en-US" smtClean="0"/>
-              <a:t>2/5/25</a:t>
+              <a:t>4/28/25</a:t>
             </a:fld>
             <a:endParaRPr lang="en-US"/>
           </a:p>
@@ -1158,7 +1214,7 @@
           <a:p>
             <a:fld id="{B9AF1358-2D8A-7743-80A8-998FCC7F2732}" type="datetimeFigureOut">
               <a:rPr lang="en-US" smtClean="0"/>
-              <a:t>2/5/25</a:t>
+              <a:t>4/28/25</a:t>
             </a:fld>
             <a:endParaRPr lang="en-US"/>
           </a:p>
@@ -1358,7 +1414,7 @@
           <a:p>
             <a:fld id="{B9AF1358-2D8A-7743-80A8-998FCC7F2732}" type="datetimeFigureOut">
               <a:rPr lang="en-US" smtClean="0"/>
-              <a:t>2/5/25</a:t>
+              <a:t>4/28/25</a:t>
             </a:fld>
             <a:endParaRPr lang="en-US"/>
           </a:p>
@@ -1634,7 +1690,7 @@
           <a:p>
             <a:fld id="{B9AF1358-2D8A-7743-80A8-998FCC7F2732}" type="datetimeFigureOut">
               <a:rPr lang="en-US" smtClean="0"/>
-              <a:t>2/5/25</a:t>
+              <a:t>4/28/25</a:t>
             </a:fld>
             <a:endParaRPr lang="en-US"/>
           </a:p>
@@ -1902,7 +1958,7 @@
           <a:p>
             <a:fld id="{B9AF1358-2D8A-7743-80A8-998FCC7F2732}" type="datetimeFigureOut">
               <a:rPr lang="en-US" smtClean="0"/>
-              <a:t>2/5/25</a:t>
+              <a:t>4/28/25</a:t>
             </a:fld>
             <a:endParaRPr lang="en-US"/>
           </a:p>
@@ -2317,7 +2373,7 @@
           <a:p>
             <a:fld id="{B9AF1358-2D8A-7743-80A8-998FCC7F2732}" type="datetimeFigureOut">
               <a:rPr lang="en-US" smtClean="0"/>
-              <a:t>2/5/25</a:t>
+              <a:t>4/28/25</a:t>
             </a:fld>
             <a:endParaRPr lang="en-US"/>
           </a:p>
@@ -2459,7 +2515,7 @@
           <a:p>
             <a:fld id="{B9AF1358-2D8A-7743-80A8-998FCC7F2732}" type="datetimeFigureOut">
               <a:rPr lang="en-US" smtClean="0"/>
-              <a:t>2/5/25</a:t>
+              <a:t>4/28/25</a:t>
             </a:fld>
             <a:endParaRPr lang="en-US"/>
           </a:p>
@@ -2572,7 +2628,7 @@
           <a:p>
             <a:fld id="{B9AF1358-2D8A-7743-80A8-998FCC7F2732}" type="datetimeFigureOut">
               <a:rPr lang="en-US" smtClean="0"/>
-              <a:t>2/5/25</a:t>
+              <a:t>4/28/25</a:t>
             </a:fld>
             <a:endParaRPr lang="en-US"/>
           </a:p>
@@ -2885,7 +2941,7 @@
           <a:p>
             <a:fld id="{B9AF1358-2D8A-7743-80A8-998FCC7F2732}" type="datetimeFigureOut">
               <a:rPr lang="en-US" smtClean="0"/>
-              <a:t>2/5/25</a:t>
+              <a:t>4/28/25</a:t>
             </a:fld>
             <a:endParaRPr lang="en-US"/>
           </a:p>
@@ -3174,7 +3230,7 @@
           <a:p>
             <a:fld id="{B9AF1358-2D8A-7743-80A8-998FCC7F2732}" type="datetimeFigureOut">
               <a:rPr lang="en-US" smtClean="0"/>
-              <a:t>2/5/25</a:t>
+              <a:t>4/28/25</a:t>
             </a:fld>
             <a:endParaRPr lang="en-US"/>
           </a:p>
@@ -3417,7 +3473,7 @@
           <a:p>
             <a:fld id="{B9AF1358-2D8A-7743-80A8-998FCC7F2732}" type="datetimeFigureOut">
               <a:rPr lang="en-US" smtClean="0"/>
-              <a:t>2/5/25</a:t>
+              <a:t>4/28/25</a:t>
             </a:fld>
             <a:endParaRPr lang="en-US"/>
           </a:p>
@@ -4131,6 +4187,154 @@
         <p:cNvPr id="1" name="">
           <a:extLst>
             <a:ext uri="{FF2B5EF4-FFF2-40B4-BE49-F238E27FC236}">
+              <a16:creationId xmlns:a16="http://schemas.microsoft.com/office/drawing/2014/main" id="{57C506CE-72FA-30BE-B8B9-67E1E6B584BF}"/>
+            </a:ext>
+          </a:extLst>
+        </p:cNvPr>
+        <p:cNvGrpSpPr/>
+        <p:nvPr/>
+      </p:nvGrpSpPr>
+      <p:grpSpPr>
+        <a:xfrm>
+          <a:off x="0" y="0"/>
+          <a:ext cx="0" cy="0"/>
+          <a:chOff x="0" y="0"/>
+          <a:chExt cx="0" cy="0"/>
+        </a:xfrm>
+      </p:grpSpPr>
+      <p:pic>
+        <p:nvPicPr>
+          <p:cNvPr id="15" name="Picture 14">
+            <a:extLst>
+              <a:ext uri="{FF2B5EF4-FFF2-40B4-BE49-F238E27FC236}">
+                <a16:creationId xmlns:a16="http://schemas.microsoft.com/office/drawing/2014/main" id="{6FA9B8AC-39F3-952B-3524-296BE5929308}"/>
+              </a:ext>
+            </a:extLst>
+          </p:cNvPr>
+          <p:cNvPicPr>
+            <a:picLocks noChangeAspect="1"/>
+          </p:cNvPicPr>
+          <p:nvPr/>
+        </p:nvPicPr>
+        <p:blipFill>
+          <a:blip r:embed="rId2"/>
+          <a:stretch>
+            <a:fillRect/>
+          </a:stretch>
+        </p:blipFill>
+        <p:spPr>
+          <a:xfrm>
+            <a:off x="3327465" y="1947221"/>
+            <a:ext cx="1956690" cy="2129339"/>
+          </a:xfrm>
+          <a:prstGeom prst="rect">
+            <a:avLst/>
+          </a:prstGeom>
+        </p:spPr>
+      </p:pic>
+      <p:sp>
+        <p:nvSpPr>
+          <p:cNvPr id="16" name="TextBox 15">
+            <a:extLst>
+              <a:ext uri="{FF2B5EF4-FFF2-40B4-BE49-F238E27FC236}">
+                <a16:creationId xmlns:a16="http://schemas.microsoft.com/office/drawing/2014/main" id="{3850E132-CE44-4FA8-12B2-AB69839EF53D}"/>
+              </a:ext>
+            </a:extLst>
+          </p:cNvPr>
+          <p:cNvSpPr txBox="1"/>
+          <p:nvPr/>
+        </p:nvSpPr>
+        <p:spPr>
+          <a:xfrm>
+            <a:off x="5225241" y="2064923"/>
+            <a:ext cx="2931944" cy="1477328"/>
+          </a:xfrm>
+          <a:prstGeom prst="rect">
+            <a:avLst/>
+          </a:prstGeom>
+          <a:noFill/>
+        </p:spPr>
+        <p:txBody>
+          <a:bodyPr wrap="square" rtlCol="0">
+            <a:spAutoFit/>
+          </a:bodyPr>
+          <a:lstStyle/>
+          <a:p>
+            <a:pPr algn="ctr"/>
+            <a:r>
+              <a:rPr lang="en-US" sz="9000" b="1" dirty="0">
+                <a:solidFill>
+                  <a:srgbClr val="545455"/>
+                </a:solidFill>
+                <a:latin typeface="SF Orson Casual Medium" pitchFamily="2" charset="0"/>
+              </a:rPr>
+              <a:t>RCM</a:t>
+            </a:r>
+          </a:p>
+        </p:txBody>
+      </p:sp>
+      <p:sp>
+        <p:nvSpPr>
+          <p:cNvPr id="2" name="TextBox 1">
+            <a:extLst>
+              <a:ext uri="{FF2B5EF4-FFF2-40B4-BE49-F238E27FC236}">
+                <a16:creationId xmlns:a16="http://schemas.microsoft.com/office/drawing/2014/main" id="{35E25FF8-0506-8A6F-340C-46F748CA9204}"/>
+              </a:ext>
+            </a:extLst>
+          </p:cNvPr>
+          <p:cNvSpPr txBox="1"/>
+          <p:nvPr/>
+        </p:nvSpPr>
+        <p:spPr>
+          <a:xfrm>
+            <a:off x="5082215" y="3368674"/>
+            <a:ext cx="3217997" cy="707886"/>
+          </a:xfrm>
+          <a:prstGeom prst="rect">
+            <a:avLst/>
+          </a:prstGeom>
+          <a:noFill/>
+        </p:spPr>
+        <p:txBody>
+          <a:bodyPr wrap="none" rtlCol="0">
+            <a:spAutoFit/>
+          </a:bodyPr>
+          <a:lstStyle/>
+          <a:p>
+            <a:pPr algn="ctr"/>
+            <a:r>
+              <a:rPr lang="en-US" sz="4000" b="1" dirty="0">
+                <a:solidFill>
+                  <a:srgbClr val="545455"/>
+                </a:solidFill>
+                <a:latin typeface="SF Orson Casual Medium" pitchFamily="2" charset="0"/>
+              </a:rPr>
+              <a:t>Cooperative</a:t>
+            </a:r>
+          </a:p>
+        </p:txBody>
+      </p:sp>
+    </p:spTree>
+    <p:extLst>
+      <p:ext uri="{BB962C8B-B14F-4D97-AF65-F5344CB8AC3E}">
+        <p14:creationId xmlns:p14="http://schemas.microsoft.com/office/powerpoint/2010/main" val="991837179"/>
+      </p:ext>
+    </p:extLst>
+  </p:cSld>
+  <p:clrMapOvr>
+    <a:masterClrMapping/>
+  </p:clrMapOvr>
+</p:sld>
+</file>
+
+<file path=ppt/slides/slide11.xml><?xml version="1.0" encoding="utf-8"?>
+<p:sld xmlns:a="http://schemas.openxmlformats.org/drawingml/2006/main" xmlns:r="http://schemas.openxmlformats.org/officeDocument/2006/relationships" xmlns:p="http://schemas.openxmlformats.org/presentationml/2006/main">
+  <p:cSld>
+    <p:spTree>
+      <p:nvGrpSpPr>
+        <p:cNvPr id="1" name="">
+          <a:extLst>
+            <a:ext uri="{FF2B5EF4-FFF2-40B4-BE49-F238E27FC236}">
               <a16:creationId xmlns:a16="http://schemas.microsoft.com/office/drawing/2014/main" id="{E5D8A59F-3D34-86C7-6062-1BFC2F8FF374}"/>
             </a:ext>
           </a:extLst>
@@ -4322,7 +4526,7 @@
 </p:sld>
 </file>
 
-<file path=ppt/slides/slide11.xml><?xml version="1.0" encoding="utf-8"?>
+<file path=ppt/slides/slide12.xml><?xml version="1.0" encoding="utf-8"?>
 <p:sld xmlns:a="http://schemas.openxmlformats.org/drawingml/2006/main" xmlns:r="http://schemas.openxmlformats.org/officeDocument/2006/relationships" xmlns:p="http://schemas.openxmlformats.org/presentationml/2006/main">
   <p:cSld>
     <p:spTree>
@@ -4910,7 +5114,7 @@
         </p:blipFill>
         <p:spPr>
           <a:xfrm>
-            <a:off x="4000874" y="4047691"/>
+            <a:off x="3916497" y="3960831"/>
             <a:ext cx="7772400" cy="1034617"/>
           </a:xfrm>
           <a:prstGeom prst="rect">
@@ -5592,116 +5796,137 @@
           <a:chExt cx="0" cy="0"/>
         </a:xfrm>
       </p:grpSpPr>
-      <p:pic>
-        <p:nvPicPr>
-          <p:cNvPr id="15" name="Picture 14">
-            <a:extLst>
-              <a:ext uri="{FF2B5EF4-FFF2-40B4-BE49-F238E27FC236}">
-                <a16:creationId xmlns:a16="http://schemas.microsoft.com/office/drawing/2014/main" id="{7DAEF6B5-E232-7248-4DCD-902F9DB96869}"/>
-              </a:ext>
-            </a:extLst>
-          </p:cNvPr>
-          <p:cNvPicPr>
-            <a:picLocks noChangeAspect="1"/>
-          </p:cNvPicPr>
+      <p:grpSp>
+        <p:nvGrpSpPr>
+          <p:cNvPr id="2" name="Group 1">
+            <a:extLst>
+              <a:ext uri="{FF2B5EF4-FFF2-40B4-BE49-F238E27FC236}">
+                <a16:creationId xmlns:a16="http://schemas.microsoft.com/office/drawing/2014/main" id="{D09EFF0C-069A-F548-A200-428A26541F1B}"/>
+              </a:ext>
+            </a:extLst>
+          </p:cNvPr>
+          <p:cNvGrpSpPr/>
           <p:nvPr/>
-        </p:nvPicPr>
-        <p:blipFill>
-          <a:blip r:embed="rId2"/>
-          <a:stretch>
-            <a:fillRect/>
-          </a:stretch>
-        </p:blipFill>
-        <p:spPr>
+        </p:nvGrpSpPr>
+        <p:grpSpPr>
           <a:xfrm>
             <a:off x="1167789" y="1256294"/>
-            <a:ext cx="1996540" cy="2172706"/>
-          </a:xfrm>
-          <a:prstGeom prst="rect">
-            <a:avLst/>
-          </a:prstGeom>
-        </p:spPr>
-      </p:pic>
-      <p:sp>
-        <p:nvSpPr>
-          <p:cNvPr id="16" name="TextBox 15">
-            <a:extLst>
-              <a:ext uri="{FF2B5EF4-FFF2-40B4-BE49-F238E27FC236}">
-                <a16:creationId xmlns:a16="http://schemas.microsoft.com/office/drawing/2014/main" id="{69A27A11-989A-D3D1-E9CB-A4F2DA2C232B}"/>
-              </a:ext>
-            </a:extLst>
-          </p:cNvPr>
-          <p:cNvSpPr txBox="1"/>
-          <p:nvPr/>
-        </p:nvSpPr>
-        <p:spPr>
-          <a:xfrm>
-            <a:off x="3323082" y="1551684"/>
-            <a:ext cx="8141909" cy="1246495"/>
-          </a:xfrm>
-          <a:prstGeom prst="rect">
-            <a:avLst/>
-          </a:prstGeom>
-          <a:noFill/>
-        </p:spPr>
-        <p:txBody>
-          <a:bodyPr wrap="none" rtlCol="0">
-            <a:spAutoFit/>
-          </a:bodyPr>
-          <a:lstStyle/>
-          <a:p>
-            <a:r>
-              <a:rPr lang="en-US" sz="7500" b="1" dirty="0">
-                <a:solidFill>
-                  <a:srgbClr val="545455"/>
-                </a:solidFill>
-                <a:latin typeface="SF Orson Casual Medium" pitchFamily="2" charset="0"/>
-              </a:rPr>
-              <a:t>RCM Cooperative</a:t>
-            </a:r>
-          </a:p>
-        </p:txBody>
-      </p:sp>
-      <p:sp>
-        <p:nvSpPr>
-          <p:cNvPr id="17" name="TextBox 16">
-            <a:extLst>
-              <a:ext uri="{FF2B5EF4-FFF2-40B4-BE49-F238E27FC236}">
-                <a16:creationId xmlns:a16="http://schemas.microsoft.com/office/drawing/2014/main" id="{1DAA92DE-3F47-D461-4A54-D721976E6B3D}"/>
-              </a:ext>
-            </a:extLst>
-          </p:cNvPr>
-          <p:cNvSpPr txBox="1"/>
-          <p:nvPr/>
-        </p:nvSpPr>
-        <p:spPr>
-          <a:xfrm>
-            <a:off x="3323082" y="2798179"/>
-            <a:ext cx="7858241" cy="500778"/>
-          </a:xfrm>
-          <a:prstGeom prst="rect">
-            <a:avLst/>
-          </a:prstGeom>
-          <a:noFill/>
-        </p:spPr>
-        <p:txBody>
-          <a:bodyPr wrap="none" rtlCol="0">
-            <a:spAutoFit/>
-          </a:bodyPr>
-          <a:lstStyle/>
-          <a:p>
-            <a:r>
-              <a:rPr lang="en-US" sz="2600" dirty="0">
-                <a:solidFill>
-                  <a:srgbClr val="545455"/>
-                </a:solidFill>
-                <a:latin typeface="Montserrat" panose="02000505000000020004" pitchFamily="2" charset="77"/>
-              </a:rPr>
-              <a:t>equitable research community management</a:t>
-            </a:r>
-          </a:p>
-        </p:txBody>
-      </p:sp>
+            <a:ext cx="10297202" cy="2172706"/>
+            <a:chOff x="1167789" y="1256294"/>
+            <a:chExt cx="10297202" cy="2172706"/>
+          </a:xfrm>
+        </p:grpSpPr>
+        <p:pic>
+          <p:nvPicPr>
+            <p:cNvPr id="15" name="Picture 14">
+              <a:extLst>
+                <a:ext uri="{FF2B5EF4-FFF2-40B4-BE49-F238E27FC236}">
+                  <a16:creationId xmlns:a16="http://schemas.microsoft.com/office/drawing/2014/main" id="{7DAEF6B5-E232-7248-4DCD-902F9DB96869}"/>
+                </a:ext>
+              </a:extLst>
+            </p:cNvPr>
+            <p:cNvPicPr>
+              <a:picLocks noChangeAspect="1"/>
+            </p:cNvPicPr>
+            <p:nvPr/>
+          </p:nvPicPr>
+          <p:blipFill>
+            <a:blip r:embed="rId2"/>
+            <a:stretch>
+              <a:fillRect/>
+            </a:stretch>
+          </p:blipFill>
+          <p:spPr>
+            <a:xfrm>
+              <a:off x="1167789" y="1256294"/>
+              <a:ext cx="1996540" cy="2172706"/>
+            </a:xfrm>
+            <a:prstGeom prst="rect">
+              <a:avLst/>
+            </a:prstGeom>
+          </p:spPr>
+        </p:pic>
+        <p:sp>
+          <p:nvSpPr>
+            <p:cNvPr id="16" name="TextBox 15">
+              <a:extLst>
+                <a:ext uri="{FF2B5EF4-FFF2-40B4-BE49-F238E27FC236}">
+                  <a16:creationId xmlns:a16="http://schemas.microsoft.com/office/drawing/2014/main" id="{69A27A11-989A-D3D1-E9CB-A4F2DA2C232B}"/>
+                </a:ext>
+              </a:extLst>
+            </p:cNvPr>
+            <p:cNvSpPr txBox="1"/>
+            <p:nvPr/>
+          </p:nvSpPr>
+          <p:spPr>
+            <a:xfrm>
+              <a:off x="3323082" y="1551684"/>
+              <a:ext cx="8141909" cy="1246495"/>
+            </a:xfrm>
+            <a:prstGeom prst="rect">
+              <a:avLst/>
+            </a:prstGeom>
+            <a:noFill/>
+          </p:spPr>
+          <p:txBody>
+            <a:bodyPr wrap="none" rtlCol="0">
+              <a:spAutoFit/>
+            </a:bodyPr>
+            <a:lstStyle/>
+            <a:p>
+              <a:r>
+                <a:rPr lang="en-US" sz="7500" b="1" dirty="0">
+                  <a:solidFill>
+                    <a:srgbClr val="545455"/>
+                  </a:solidFill>
+                  <a:latin typeface="SF Orson Casual Medium" pitchFamily="2" charset="0"/>
+                </a:rPr>
+                <a:t>RCM Cooperative</a:t>
+              </a:r>
+            </a:p>
+          </p:txBody>
+        </p:sp>
+        <p:sp>
+          <p:nvSpPr>
+            <p:cNvPr id="17" name="TextBox 16">
+              <a:extLst>
+                <a:ext uri="{FF2B5EF4-FFF2-40B4-BE49-F238E27FC236}">
+                  <a16:creationId xmlns:a16="http://schemas.microsoft.com/office/drawing/2014/main" id="{1DAA92DE-3F47-D461-4A54-D721976E6B3D}"/>
+                </a:ext>
+              </a:extLst>
+            </p:cNvPr>
+            <p:cNvSpPr txBox="1"/>
+            <p:nvPr/>
+          </p:nvSpPr>
+          <p:spPr>
+            <a:xfrm>
+              <a:off x="3323082" y="2798179"/>
+              <a:ext cx="7858241" cy="500778"/>
+            </a:xfrm>
+            <a:prstGeom prst="rect">
+              <a:avLst/>
+            </a:prstGeom>
+            <a:noFill/>
+          </p:spPr>
+          <p:txBody>
+            <a:bodyPr wrap="none" rtlCol="0">
+              <a:spAutoFit/>
+            </a:bodyPr>
+            <a:lstStyle/>
+            <a:p>
+              <a:r>
+                <a:rPr lang="en-US" sz="2600" dirty="0">
+                  <a:solidFill>
+                    <a:srgbClr val="545455"/>
+                  </a:solidFill>
+                  <a:latin typeface="Montserrat" panose="02000505000000020004" pitchFamily="2" charset="77"/>
+                </a:rPr>
+                <a:t>equitable research community management</a:t>
+              </a:r>
+            </a:p>
+          </p:txBody>
+        </p:sp>
+      </p:grpSp>
     </p:spTree>
     <p:extLst>
       <p:ext uri="{BB962C8B-B14F-4D97-AF65-F5344CB8AC3E}">
@@ -5716,6 +5941,225 @@
 </file>
 
 <file path=ppt/slides/slide4.xml><?xml version="1.0" encoding="utf-8"?>
+<p:sld xmlns:a="http://schemas.openxmlformats.org/drawingml/2006/main" xmlns:r="http://schemas.openxmlformats.org/officeDocument/2006/relationships" xmlns:p="http://schemas.openxmlformats.org/presentationml/2006/main">
+  <p:cSld>
+    <p:spTree>
+      <p:nvGrpSpPr>
+        <p:cNvPr id="1" name="">
+          <a:extLst>
+            <a:ext uri="{FF2B5EF4-FFF2-40B4-BE49-F238E27FC236}">
+              <a16:creationId xmlns:a16="http://schemas.microsoft.com/office/drawing/2014/main" id="{ABDF46B5-C9AA-66B4-AECE-820B41360BFE}"/>
+            </a:ext>
+          </a:extLst>
+        </p:cNvPr>
+        <p:cNvGrpSpPr/>
+        <p:nvPr/>
+      </p:nvGrpSpPr>
+      <p:grpSpPr>
+        <a:xfrm>
+          <a:off x="0" y="0"/>
+          <a:ext cx="0" cy="0"/>
+          <a:chOff x="0" y="0"/>
+          <a:chExt cx="0" cy="0"/>
+        </a:xfrm>
+      </p:grpSpPr>
+      <p:sp>
+        <p:nvSpPr>
+          <p:cNvPr id="8" name="Rectangle 7">
+            <a:extLst>
+              <a:ext uri="{FF2B5EF4-FFF2-40B4-BE49-F238E27FC236}">
+                <a16:creationId xmlns:a16="http://schemas.microsoft.com/office/drawing/2014/main" id="{742DB6F1-2973-D97D-F806-FF0D30E91F1F}"/>
+              </a:ext>
+            </a:extLst>
+          </p:cNvPr>
+          <p:cNvSpPr>
+            <a:spLocks noChangeAspect="1"/>
+          </p:cNvSpPr>
+          <p:nvPr/>
+        </p:nvSpPr>
+        <p:spPr>
+          <a:xfrm>
+            <a:off x="878802" y="1121390"/>
+            <a:ext cx="10733168" cy="2683292"/>
+          </a:xfrm>
+          <a:prstGeom prst="rect">
+            <a:avLst/>
+          </a:prstGeom>
+          <a:noFill/>
+          <a:ln>
+            <a:noFill/>
+          </a:ln>
+        </p:spPr>
+        <p:style>
+          <a:lnRef idx="2">
+            <a:schemeClr val="accent1">
+              <a:shade val="15000"/>
+            </a:schemeClr>
+          </a:lnRef>
+          <a:fillRef idx="1">
+            <a:schemeClr val="accent1"/>
+          </a:fillRef>
+          <a:effectRef idx="0">
+            <a:schemeClr val="accent1"/>
+          </a:effectRef>
+          <a:fontRef idx="minor">
+            <a:schemeClr val="lt1"/>
+          </a:fontRef>
+        </p:style>
+        <p:txBody>
+          <a:bodyPr rtlCol="0" anchor="ctr"/>
+          <a:lstStyle/>
+          <a:p>
+            <a:pPr algn="ctr"/>
+            <a:endParaRPr lang="en-US"/>
+          </a:p>
+        </p:txBody>
+      </p:sp>
+      <p:grpSp>
+        <p:nvGrpSpPr>
+          <p:cNvPr id="2" name="Group 1">
+            <a:extLst>
+              <a:ext uri="{FF2B5EF4-FFF2-40B4-BE49-F238E27FC236}">
+                <a16:creationId xmlns:a16="http://schemas.microsoft.com/office/drawing/2014/main" id="{9D9AE90F-3401-8BC1-BA6B-B1EE0CB4064E}"/>
+              </a:ext>
+            </a:extLst>
+          </p:cNvPr>
+          <p:cNvGrpSpPr/>
+          <p:nvPr/>
+        </p:nvGrpSpPr>
+        <p:grpSpPr>
+          <a:xfrm>
+            <a:off x="1096785" y="1376683"/>
+            <a:ext cx="10297202" cy="2172706"/>
+            <a:chOff x="1167789" y="1256294"/>
+            <a:chExt cx="10297202" cy="2172706"/>
+          </a:xfrm>
+        </p:grpSpPr>
+        <p:pic>
+          <p:nvPicPr>
+            <p:cNvPr id="15" name="Picture 14">
+              <a:extLst>
+                <a:ext uri="{FF2B5EF4-FFF2-40B4-BE49-F238E27FC236}">
+                  <a16:creationId xmlns:a16="http://schemas.microsoft.com/office/drawing/2014/main" id="{645EBF39-8797-7394-7D92-B22CD631DB92}"/>
+                </a:ext>
+              </a:extLst>
+            </p:cNvPr>
+            <p:cNvPicPr>
+              <a:picLocks noChangeAspect="1"/>
+            </p:cNvPicPr>
+            <p:nvPr/>
+          </p:nvPicPr>
+          <p:blipFill>
+            <a:blip r:embed="rId2"/>
+            <a:stretch>
+              <a:fillRect/>
+            </a:stretch>
+          </p:blipFill>
+          <p:spPr>
+            <a:xfrm>
+              <a:off x="1167789" y="1256294"/>
+              <a:ext cx="1996540" cy="2172706"/>
+            </a:xfrm>
+            <a:prstGeom prst="rect">
+              <a:avLst/>
+            </a:prstGeom>
+          </p:spPr>
+        </p:pic>
+        <p:sp>
+          <p:nvSpPr>
+            <p:cNvPr id="16" name="TextBox 15">
+              <a:extLst>
+                <a:ext uri="{FF2B5EF4-FFF2-40B4-BE49-F238E27FC236}">
+                  <a16:creationId xmlns:a16="http://schemas.microsoft.com/office/drawing/2014/main" id="{9D5688E7-131F-71F6-D51F-5C4D4FB6E067}"/>
+                </a:ext>
+              </a:extLst>
+            </p:cNvPr>
+            <p:cNvSpPr txBox="1"/>
+            <p:nvPr/>
+          </p:nvSpPr>
+          <p:spPr>
+            <a:xfrm>
+              <a:off x="3323082" y="1551684"/>
+              <a:ext cx="8141909" cy="1246495"/>
+            </a:xfrm>
+            <a:prstGeom prst="rect">
+              <a:avLst/>
+            </a:prstGeom>
+            <a:noFill/>
+          </p:spPr>
+          <p:txBody>
+            <a:bodyPr wrap="none" rtlCol="0">
+              <a:spAutoFit/>
+            </a:bodyPr>
+            <a:lstStyle/>
+            <a:p>
+              <a:r>
+                <a:rPr lang="en-US" sz="7500" b="1" dirty="0">
+                  <a:solidFill>
+                    <a:srgbClr val="545455"/>
+                  </a:solidFill>
+                  <a:latin typeface="SF Orson Casual Medium" pitchFamily="2" charset="0"/>
+                </a:rPr>
+                <a:t>RCM Cooperative</a:t>
+              </a:r>
+            </a:p>
+          </p:txBody>
+        </p:sp>
+        <p:sp>
+          <p:nvSpPr>
+            <p:cNvPr id="17" name="TextBox 16">
+              <a:extLst>
+                <a:ext uri="{FF2B5EF4-FFF2-40B4-BE49-F238E27FC236}">
+                  <a16:creationId xmlns:a16="http://schemas.microsoft.com/office/drawing/2014/main" id="{8498314F-A0DD-D8F3-A108-7F6759B04CE3}"/>
+                </a:ext>
+              </a:extLst>
+            </p:cNvPr>
+            <p:cNvSpPr txBox="1"/>
+            <p:nvPr/>
+          </p:nvSpPr>
+          <p:spPr>
+            <a:xfrm>
+              <a:off x="3323082" y="2798179"/>
+              <a:ext cx="7858241" cy="500778"/>
+            </a:xfrm>
+            <a:prstGeom prst="rect">
+              <a:avLst/>
+            </a:prstGeom>
+            <a:noFill/>
+          </p:spPr>
+          <p:txBody>
+            <a:bodyPr wrap="none" rtlCol="0">
+              <a:spAutoFit/>
+            </a:bodyPr>
+            <a:lstStyle/>
+            <a:p>
+              <a:r>
+                <a:rPr lang="en-US" sz="2600" dirty="0">
+                  <a:solidFill>
+                    <a:srgbClr val="545455"/>
+                  </a:solidFill>
+                  <a:latin typeface="Montserrat" panose="02000505000000020004" pitchFamily="2" charset="77"/>
+                </a:rPr>
+                <a:t>equitable research community management</a:t>
+              </a:r>
+            </a:p>
+          </p:txBody>
+        </p:sp>
+      </p:grpSp>
+    </p:spTree>
+    <p:extLst>
+      <p:ext uri="{BB962C8B-B14F-4D97-AF65-F5344CB8AC3E}">
+        <p14:creationId xmlns:p14="http://schemas.microsoft.com/office/powerpoint/2010/main" val="3067319856"/>
+      </p:ext>
+    </p:extLst>
+  </p:cSld>
+  <p:clrMapOvr>
+    <a:masterClrMapping/>
+  </p:clrMapOvr>
+</p:sld>
+</file>
+
+<file path=ppt/slides/slide5.xml><?xml version="1.0" encoding="utf-8"?>
 <p:sld xmlns:a="http://schemas.openxmlformats.org/drawingml/2006/main" xmlns:r="http://schemas.openxmlformats.org/officeDocument/2006/relationships" xmlns:p="http://schemas.openxmlformats.org/presentationml/2006/main">
   <p:cSld>
     <p:spTree>
@@ -5962,7 +6406,7 @@
 </p:sld>
 </file>
 
-<file path=ppt/slides/slide5.xml><?xml version="1.0" encoding="utf-8"?>
+<file path=ppt/slides/slide6.xml><?xml version="1.0" encoding="utf-8"?>
 <p:sld xmlns:a="http://schemas.openxmlformats.org/drawingml/2006/main" xmlns:r="http://schemas.openxmlformats.org/officeDocument/2006/relationships" xmlns:p="http://schemas.openxmlformats.org/presentationml/2006/main">
   <p:cSld>
     <p:spTree>
@@ -6153,7 +6597,7 @@
 </p:sld>
 </file>
 
-<file path=ppt/slides/slide6.xml><?xml version="1.0" encoding="utf-8"?>
+<file path=ppt/slides/slide7.xml><?xml version="1.0" encoding="utf-8"?>
 <p:sld xmlns:a="http://schemas.openxmlformats.org/drawingml/2006/main" xmlns:r="http://schemas.openxmlformats.org/officeDocument/2006/relationships" xmlns:p="http://schemas.openxmlformats.org/presentationml/2006/main">
   <p:cSld>
     <p:spTree>
@@ -6350,7 +6794,7 @@
 </p:sld>
 </file>
 
-<file path=ppt/slides/slide7.xml><?xml version="1.0" encoding="utf-8"?>
+<file path=ppt/slides/slide8.xml><?xml version="1.0" encoding="utf-8"?>
 <p:sld xmlns:a="http://schemas.openxmlformats.org/drawingml/2006/main" xmlns:r="http://schemas.openxmlformats.org/officeDocument/2006/relationships" xmlns:p="http://schemas.openxmlformats.org/presentationml/2006/main">
   <p:cSld>
     <p:bg>
@@ -6527,7 +6971,7 @@
 </p:sld>
 </file>
 
-<file path=ppt/slides/slide8.xml><?xml version="1.0" encoding="utf-8"?>
+<file path=ppt/slides/slide9.xml><?xml version="1.0" encoding="utf-8"?>
 <p:sld xmlns:a="http://schemas.openxmlformats.org/drawingml/2006/main" xmlns:r="http://schemas.openxmlformats.org/officeDocument/2006/relationships" xmlns:p="http://schemas.openxmlformats.org/presentationml/2006/main">
   <p:cSld>
     <p:bg>
@@ -6699,154 +7143,6 @@
     <p:extLst>
       <p:ext uri="{BB962C8B-B14F-4D97-AF65-F5344CB8AC3E}">
         <p14:creationId xmlns:p14="http://schemas.microsoft.com/office/powerpoint/2010/main" val="2701810344"/>
-      </p:ext>
-    </p:extLst>
-  </p:cSld>
-  <p:clrMapOvr>
-    <a:masterClrMapping/>
-  </p:clrMapOvr>
-</p:sld>
-</file>
-
-<file path=ppt/slides/slide9.xml><?xml version="1.0" encoding="utf-8"?>
-<p:sld xmlns:a="http://schemas.openxmlformats.org/drawingml/2006/main" xmlns:r="http://schemas.openxmlformats.org/officeDocument/2006/relationships" xmlns:p="http://schemas.openxmlformats.org/presentationml/2006/main">
-  <p:cSld>
-    <p:spTree>
-      <p:nvGrpSpPr>
-        <p:cNvPr id="1" name="">
-          <a:extLst>
-            <a:ext uri="{FF2B5EF4-FFF2-40B4-BE49-F238E27FC236}">
-              <a16:creationId xmlns:a16="http://schemas.microsoft.com/office/drawing/2014/main" id="{57C506CE-72FA-30BE-B8B9-67E1E6B584BF}"/>
-            </a:ext>
-          </a:extLst>
-        </p:cNvPr>
-        <p:cNvGrpSpPr/>
-        <p:nvPr/>
-      </p:nvGrpSpPr>
-      <p:grpSpPr>
-        <a:xfrm>
-          <a:off x="0" y="0"/>
-          <a:ext cx="0" cy="0"/>
-          <a:chOff x="0" y="0"/>
-          <a:chExt cx="0" cy="0"/>
-        </a:xfrm>
-      </p:grpSpPr>
-      <p:pic>
-        <p:nvPicPr>
-          <p:cNvPr id="15" name="Picture 14">
-            <a:extLst>
-              <a:ext uri="{FF2B5EF4-FFF2-40B4-BE49-F238E27FC236}">
-                <a16:creationId xmlns:a16="http://schemas.microsoft.com/office/drawing/2014/main" id="{6FA9B8AC-39F3-952B-3524-296BE5929308}"/>
-              </a:ext>
-            </a:extLst>
-          </p:cNvPr>
-          <p:cNvPicPr>
-            <a:picLocks noChangeAspect="1"/>
-          </p:cNvPicPr>
-          <p:nvPr/>
-        </p:nvPicPr>
-        <p:blipFill>
-          <a:blip r:embed="rId2"/>
-          <a:stretch>
-            <a:fillRect/>
-          </a:stretch>
-        </p:blipFill>
-        <p:spPr>
-          <a:xfrm>
-            <a:off x="3327465" y="1947221"/>
-            <a:ext cx="1956690" cy="2129339"/>
-          </a:xfrm>
-          <a:prstGeom prst="rect">
-            <a:avLst/>
-          </a:prstGeom>
-        </p:spPr>
-      </p:pic>
-      <p:sp>
-        <p:nvSpPr>
-          <p:cNvPr id="16" name="TextBox 15">
-            <a:extLst>
-              <a:ext uri="{FF2B5EF4-FFF2-40B4-BE49-F238E27FC236}">
-                <a16:creationId xmlns:a16="http://schemas.microsoft.com/office/drawing/2014/main" id="{3850E132-CE44-4FA8-12B2-AB69839EF53D}"/>
-              </a:ext>
-            </a:extLst>
-          </p:cNvPr>
-          <p:cNvSpPr txBox="1"/>
-          <p:nvPr/>
-        </p:nvSpPr>
-        <p:spPr>
-          <a:xfrm>
-            <a:off x="5225241" y="2064923"/>
-            <a:ext cx="2931944" cy="1477328"/>
-          </a:xfrm>
-          <a:prstGeom prst="rect">
-            <a:avLst/>
-          </a:prstGeom>
-          <a:noFill/>
-        </p:spPr>
-        <p:txBody>
-          <a:bodyPr wrap="square" rtlCol="0">
-            <a:spAutoFit/>
-          </a:bodyPr>
-          <a:lstStyle/>
-          <a:p>
-            <a:pPr algn="ctr"/>
-            <a:r>
-              <a:rPr lang="en-US" sz="9000" b="1" dirty="0">
-                <a:solidFill>
-                  <a:srgbClr val="545455"/>
-                </a:solidFill>
-                <a:latin typeface="SF Orson Casual Medium" pitchFamily="2" charset="0"/>
-              </a:rPr>
-              <a:t>RCM</a:t>
-            </a:r>
-          </a:p>
-        </p:txBody>
-      </p:sp>
-      <p:sp>
-        <p:nvSpPr>
-          <p:cNvPr id="2" name="TextBox 1">
-            <a:extLst>
-              <a:ext uri="{FF2B5EF4-FFF2-40B4-BE49-F238E27FC236}">
-                <a16:creationId xmlns:a16="http://schemas.microsoft.com/office/drawing/2014/main" id="{35E25FF8-0506-8A6F-340C-46F748CA9204}"/>
-              </a:ext>
-            </a:extLst>
-          </p:cNvPr>
-          <p:cNvSpPr txBox="1"/>
-          <p:nvPr/>
-        </p:nvSpPr>
-        <p:spPr>
-          <a:xfrm>
-            <a:off x="5082215" y="3368674"/>
-            <a:ext cx="3217997" cy="707886"/>
-          </a:xfrm>
-          <a:prstGeom prst="rect">
-            <a:avLst/>
-          </a:prstGeom>
-          <a:noFill/>
-        </p:spPr>
-        <p:txBody>
-          <a:bodyPr wrap="none" rtlCol="0">
-            <a:spAutoFit/>
-          </a:bodyPr>
-          <a:lstStyle/>
-          <a:p>
-            <a:pPr algn="ctr"/>
-            <a:r>
-              <a:rPr lang="en-US" sz="4000" b="1" dirty="0">
-                <a:solidFill>
-                  <a:srgbClr val="545455"/>
-                </a:solidFill>
-                <a:latin typeface="SF Orson Casual Medium" pitchFamily="2" charset="0"/>
-              </a:rPr>
-              <a:t>Cooperative</a:t>
-            </a:r>
-          </a:p>
-        </p:txBody>
-      </p:sp>
-    </p:spTree>
-    <p:extLst>
-      <p:ext uri="{BB962C8B-B14F-4D97-AF65-F5344CB8AC3E}">
-        <p14:creationId xmlns:p14="http://schemas.microsoft.com/office/powerpoint/2010/main" val="991837179"/>
       </p:ext>
     </p:extLst>
   </p:cSld>

</xml_diff>